<commit_message>
Added First Two Slides
</commit_message>
<xml_diff>
--- a/PresentationDeck1.pptx
+++ b/PresentationDeck1.pptx
@@ -1,12 +1,14 @@
 
 <file path=ppt/presentation.xml><?xml version="1.0" encoding="utf-8"?>
-<p:presentation xmlns:a="http://schemas.openxmlformats.org/drawingml/2006/main" xmlns:p="http://schemas.openxmlformats.org/presentationml/2006/main" xmlns:r="http://schemas.openxmlformats.org/officeDocument/2006/relationships" autoCompressPictures="0" saveSubsetFonts="1">
+<p:presentation xmlns:a="http://schemas.openxmlformats.org/drawingml/2006/main" xmlns:r="http://schemas.openxmlformats.org/officeDocument/2006/relationships" xmlns:p="http://schemas.openxmlformats.org/presentationml/2006/main" saveSubsetFonts="1" autoCompressPictures="0">
   <p:sldMasterIdLst>
     <p:sldMasterId id="2147483648" r:id="rId1"/>
   </p:sldMasterIdLst>
   <p:sldIdLst>
     <p:sldId id="256" r:id="rId2"/>
     <p:sldId id="257" r:id="rId3"/>
+    <p:sldId id="258" r:id="rId4"/>
+    <p:sldId id="259" r:id="rId5"/>
   </p:sldIdLst>
   <p:sldSz cx="9144000" cy="5143500" type="screen16x9"/>
   <p:notesSz cx="6858000" cy="9144000"/>
@@ -14,8 +16,8 @@
     <a:defPPr>
       <a:defRPr lang="en-US"/>
     </a:defPPr>
-    <a:lvl1pPr algn="l" defTabSz="457200" eaLnBrk="1" hangingPunct="1" latinLnBrk="0" marL="0" rtl="0">
-      <a:defRPr kern="1200" sz="1800">
+    <a:lvl1pPr marL="0" algn="l" defTabSz="457200" rtl="0" eaLnBrk="1" latinLnBrk="0" hangingPunct="1">
+      <a:defRPr sz="1800" kern="1200">
         <a:solidFill>
           <a:schemeClr val="tx1"/>
         </a:solidFill>
@@ -24,8 +26,8 @@
         <a:cs typeface="+mn-cs"/>
       </a:defRPr>
     </a:lvl1pPr>
-    <a:lvl2pPr algn="l" defTabSz="457200" eaLnBrk="1" hangingPunct="1" latinLnBrk="0" marL="457200" rtl="0">
-      <a:defRPr kern="1200" sz="1800">
+    <a:lvl2pPr marL="457200" algn="l" defTabSz="457200" rtl="0" eaLnBrk="1" latinLnBrk="0" hangingPunct="1">
+      <a:defRPr sz="1800" kern="1200">
         <a:solidFill>
           <a:schemeClr val="tx1"/>
         </a:solidFill>
@@ -34,8 +36,8 @@
         <a:cs typeface="+mn-cs"/>
       </a:defRPr>
     </a:lvl2pPr>
-    <a:lvl3pPr algn="l" defTabSz="457200" eaLnBrk="1" hangingPunct="1" latinLnBrk="0" marL="914400" rtl="0">
-      <a:defRPr kern="1200" sz="1800">
+    <a:lvl3pPr marL="914400" algn="l" defTabSz="457200" rtl="0" eaLnBrk="1" latinLnBrk="0" hangingPunct="1">
+      <a:defRPr sz="1800" kern="1200">
         <a:solidFill>
           <a:schemeClr val="tx1"/>
         </a:solidFill>
@@ -44,8 +46,8 @@
         <a:cs typeface="+mn-cs"/>
       </a:defRPr>
     </a:lvl3pPr>
-    <a:lvl4pPr algn="l" defTabSz="457200" eaLnBrk="1" hangingPunct="1" latinLnBrk="0" marL="1371600" rtl="0">
-      <a:defRPr kern="1200" sz="1800">
+    <a:lvl4pPr marL="1371600" algn="l" defTabSz="457200" rtl="0" eaLnBrk="1" latinLnBrk="0" hangingPunct="1">
+      <a:defRPr sz="1800" kern="1200">
         <a:solidFill>
           <a:schemeClr val="tx1"/>
         </a:solidFill>
@@ -54,8 +56,8 @@
         <a:cs typeface="+mn-cs"/>
       </a:defRPr>
     </a:lvl4pPr>
-    <a:lvl5pPr algn="l" defTabSz="457200" eaLnBrk="1" hangingPunct="1" latinLnBrk="0" marL="1828800" rtl="0">
-      <a:defRPr kern="1200" sz="1800">
+    <a:lvl5pPr marL="1828800" algn="l" defTabSz="457200" rtl="0" eaLnBrk="1" latinLnBrk="0" hangingPunct="1">
+      <a:defRPr sz="1800" kern="1200">
         <a:solidFill>
           <a:schemeClr val="tx1"/>
         </a:solidFill>
@@ -64,8 +66,8 @@
         <a:cs typeface="+mn-cs"/>
       </a:defRPr>
     </a:lvl5pPr>
-    <a:lvl6pPr algn="l" defTabSz="457200" eaLnBrk="1" hangingPunct="1" latinLnBrk="0" marL="2286000" rtl="0">
-      <a:defRPr kern="1200" sz="1800">
+    <a:lvl6pPr marL="2286000" algn="l" defTabSz="457200" rtl="0" eaLnBrk="1" latinLnBrk="0" hangingPunct="1">
+      <a:defRPr sz="1800" kern="1200">
         <a:solidFill>
           <a:schemeClr val="tx1"/>
         </a:solidFill>
@@ -74,8 +76,8 @@
         <a:cs typeface="+mn-cs"/>
       </a:defRPr>
     </a:lvl6pPr>
-    <a:lvl7pPr algn="l" defTabSz="457200" eaLnBrk="1" hangingPunct="1" latinLnBrk="0" marL="2743200" rtl="0">
-      <a:defRPr kern="1200" sz="1800">
+    <a:lvl7pPr marL="2743200" algn="l" defTabSz="457200" rtl="0" eaLnBrk="1" latinLnBrk="0" hangingPunct="1">
+      <a:defRPr sz="1800" kern="1200">
         <a:solidFill>
           <a:schemeClr val="tx1"/>
         </a:solidFill>
@@ -84,8 +86,8 @@
         <a:cs typeface="+mn-cs"/>
       </a:defRPr>
     </a:lvl7pPr>
-    <a:lvl8pPr algn="l" defTabSz="457200" eaLnBrk="1" hangingPunct="1" latinLnBrk="0" marL="3200400" rtl="0">
-      <a:defRPr kern="1200" sz="1800">
+    <a:lvl8pPr marL="3200400" algn="l" defTabSz="457200" rtl="0" eaLnBrk="1" latinLnBrk="0" hangingPunct="1">
+      <a:defRPr sz="1800" kern="1200">
         <a:solidFill>
           <a:schemeClr val="tx1"/>
         </a:solidFill>
@@ -94,8 +96,8 @@
         <a:cs typeface="+mn-cs"/>
       </a:defRPr>
     </a:lvl8pPr>
-    <a:lvl9pPr algn="l" defTabSz="457200" eaLnBrk="1" hangingPunct="1" latinLnBrk="0" marL="3657600" rtl="0">
-      <a:defRPr kern="1200" sz="1800">
+    <a:lvl9pPr marL="3657600" algn="l" defTabSz="457200" rtl="0" eaLnBrk="1" latinLnBrk="0" hangingPunct="1">
+      <a:defRPr sz="1800" kern="1200">
         <a:solidFill>
           <a:schemeClr val="tx1"/>
         </a:solidFill>
@@ -303,7 +305,7 @@
           <a:p>
             <a:fld id="{241EB5C9-1307-BA42-ABA2-0BC069CD8E7F}" type="datetimeFigureOut">
               <a:rPr lang="en-US" smtClean="0"/>
-              <a:t>1/2/22</a:t>
+              <a:t>3/3/2025</a:t>
             </a:fld>
             <a:endParaRPr lang="en-US"/>
           </a:p>
@@ -471,7 +473,7 @@
           <a:p>
             <a:fld id="{241EB5C9-1307-BA42-ABA2-0BC069CD8E7F}" type="datetimeFigureOut">
               <a:rPr lang="en-US" smtClean="0"/>
-              <a:t>1/2/22</a:t>
+              <a:t>3/3/2025</a:t>
             </a:fld>
             <a:endParaRPr lang="en-US"/>
           </a:p>
@@ -649,7 +651,7 @@
           <a:p>
             <a:fld id="{241EB5C9-1307-BA42-ABA2-0BC069CD8E7F}" type="datetimeFigureOut">
               <a:rPr lang="en-US" smtClean="0"/>
-              <a:t>1/2/22</a:t>
+              <a:t>3/3/2025</a:t>
             </a:fld>
             <a:endParaRPr lang="en-US"/>
           </a:p>
@@ -817,7 +819,7 @@
           <a:p>
             <a:fld id="{241EB5C9-1307-BA42-ABA2-0BC069CD8E7F}" type="datetimeFigureOut">
               <a:rPr lang="en-US" smtClean="0"/>
-              <a:t>1/2/22</a:t>
+              <a:t>3/3/2025</a:t>
             </a:fld>
             <a:endParaRPr lang="en-US"/>
           </a:p>
@@ -1062,7 +1064,7 @@
           <a:p>
             <a:fld id="{241EB5C9-1307-BA42-ABA2-0BC069CD8E7F}" type="datetimeFigureOut">
               <a:rPr lang="en-US" smtClean="0"/>
-              <a:t>1/2/22</a:t>
+              <a:t>3/3/2025</a:t>
             </a:fld>
             <a:endParaRPr lang="en-US"/>
           </a:p>
@@ -1347,7 +1349,7 @@
           <a:p>
             <a:fld id="{241EB5C9-1307-BA42-ABA2-0BC069CD8E7F}" type="datetimeFigureOut">
               <a:rPr lang="en-US" smtClean="0"/>
-              <a:t>1/2/22</a:t>
+              <a:t>3/3/2025</a:t>
             </a:fld>
             <a:endParaRPr lang="en-US"/>
           </a:p>
@@ -1766,7 +1768,7 @@
           <a:p>
             <a:fld id="{241EB5C9-1307-BA42-ABA2-0BC069CD8E7F}" type="datetimeFigureOut">
               <a:rPr lang="en-US" smtClean="0"/>
-              <a:t>1/2/22</a:t>
+              <a:t>3/3/2025</a:t>
             </a:fld>
             <a:endParaRPr lang="en-US"/>
           </a:p>
@@ -1883,7 +1885,7 @@
           <a:p>
             <a:fld id="{241EB5C9-1307-BA42-ABA2-0BC069CD8E7F}" type="datetimeFigureOut">
               <a:rPr lang="en-US" smtClean="0"/>
-              <a:t>1/2/22</a:t>
+              <a:t>3/3/2025</a:t>
             </a:fld>
             <a:endParaRPr lang="en-US"/>
           </a:p>
@@ -1978,7 +1980,7 @@
           <a:p>
             <a:fld id="{241EB5C9-1307-BA42-ABA2-0BC069CD8E7F}" type="datetimeFigureOut">
               <a:rPr lang="en-US" smtClean="0"/>
-              <a:t>1/2/22</a:t>
+              <a:t>3/3/2025</a:t>
             </a:fld>
             <a:endParaRPr lang="en-US"/>
           </a:p>
@@ -2253,7 +2255,7 @@
           <a:p>
             <a:fld id="{241EB5C9-1307-BA42-ABA2-0BC069CD8E7F}" type="datetimeFigureOut">
               <a:rPr lang="en-US" smtClean="0"/>
-              <a:t>1/2/22</a:t>
+              <a:t>3/3/2025</a:t>
             </a:fld>
             <a:endParaRPr lang="en-US"/>
           </a:p>
@@ -2505,7 +2507,7 @@
           <a:p>
             <a:fld id="{241EB5C9-1307-BA42-ABA2-0BC069CD8E7F}" type="datetimeFigureOut">
               <a:rPr lang="en-US" smtClean="0"/>
-              <a:t>1/2/22</a:t>
+              <a:t>3/3/2025</a:t>
             </a:fld>
             <a:endParaRPr lang="en-US"/>
           </a:p>
@@ -2567,7 +2569,7 @@
 </file>
 
 <file path=ppt/slideMasters/slideMaster1.xml><?xml version="1.0" encoding="utf-8"?>
-<p:sldMaster xmlns:a="http://schemas.openxmlformats.org/drawingml/2006/main" xmlns:p="http://schemas.openxmlformats.org/presentationml/2006/main" xmlns:r="http://schemas.openxmlformats.org/officeDocument/2006/relationships">
+<p:sldMaster xmlns:a="http://schemas.openxmlformats.org/drawingml/2006/main" xmlns:r="http://schemas.openxmlformats.org/officeDocument/2006/relationships" xmlns:p="http://schemas.openxmlformats.org/presentationml/2006/main">
   <p:cSld>
     <p:bg>
       <p:bgRef idx="1001">
@@ -2608,7 +2610,7 @@
           </a:prstGeom>
         </p:spPr>
         <p:txBody>
-          <a:bodyPr anchor="ctr" bIns="45720" lIns="91440" rIns="91440" rtlCol="0" tIns="45720" vert="horz">
+          <a:bodyPr vert="horz" lIns="91440" tIns="45720" rIns="91440" bIns="45720" rtlCol="0" anchor="ctr">
             <a:normAutofit/>
           </a:bodyPr>
           <a:lstStyle/>
@@ -2627,7 +2629,7 @@
             <a:spLocks noGrp="1"/>
           </p:cNvSpPr>
           <p:nvPr>
-            <p:ph idx="1" type="body"/>
+            <p:ph type="body" idx="1"/>
           </p:nvPr>
         </p:nvSpPr>
         <p:spPr>
@@ -2640,7 +2642,7 @@
           </a:prstGeom>
         </p:spPr>
         <p:txBody>
-          <a:bodyPr bIns="45720" lIns="91440" rIns="91440" rtlCol="0" tIns="45720" vert="horz">
+          <a:bodyPr vert="horz" lIns="91440" tIns="45720" rIns="91440" bIns="45720" rtlCol="0">
             <a:normAutofit/>
           </a:bodyPr>
           <a:lstStyle/>
@@ -2688,7 +2690,7 @@
             <a:spLocks noGrp="1"/>
           </p:cNvSpPr>
           <p:nvPr>
-            <p:ph idx="2" sz="half" type="dt"/>
+            <p:ph type="dt" sz="half" idx="2"/>
           </p:nvPr>
         </p:nvSpPr>
         <p:spPr>
@@ -2701,7 +2703,7 @@
           </a:prstGeom>
         </p:spPr>
         <p:txBody>
-          <a:bodyPr anchor="ctr" bIns="45720" lIns="91440" rIns="91440" rtlCol="0" tIns="45720" vert="horz"/>
+          <a:bodyPr vert="horz" lIns="91440" tIns="45720" rIns="91440" bIns="45720" rtlCol="0" anchor="ctr"/>
           <a:lstStyle>
             <a:lvl1pPr algn="l">
               <a:defRPr sz="900">
@@ -2716,7 +2718,7 @@
           <a:p>
             <a:fld id="{241EB5C9-1307-BA42-ABA2-0BC069CD8E7F}" type="datetimeFigureOut">
               <a:rPr lang="en-US" smtClean="0"/>
-              <a:t>1/2/22</a:t>
+              <a:t>3/3/2025</a:t>
             </a:fld>
             <a:endParaRPr lang="en-US"/>
           </a:p>
@@ -2729,7 +2731,7 @@
             <a:spLocks noGrp="1"/>
           </p:cNvSpPr>
           <p:nvPr>
-            <p:ph idx="3" sz="quarter" type="ftr"/>
+            <p:ph type="ftr" sz="quarter" idx="3"/>
           </p:nvPr>
         </p:nvSpPr>
         <p:spPr>
@@ -2742,7 +2744,7 @@
           </a:prstGeom>
         </p:spPr>
         <p:txBody>
-          <a:bodyPr anchor="ctr" bIns="45720" lIns="91440" rIns="91440" rtlCol="0" tIns="45720" vert="horz"/>
+          <a:bodyPr vert="horz" lIns="91440" tIns="45720" rIns="91440" bIns="45720" rtlCol="0" anchor="ctr"/>
           <a:lstStyle>
             <a:lvl1pPr algn="ctr">
               <a:defRPr sz="900">
@@ -2766,7 +2768,7 @@
             <a:spLocks noGrp="1"/>
           </p:cNvSpPr>
           <p:nvPr>
-            <p:ph idx="4" sz="quarter" type="sldNum"/>
+            <p:ph type="sldNum" sz="quarter" idx="4"/>
           </p:nvPr>
         </p:nvSpPr>
         <p:spPr>
@@ -2779,7 +2781,7 @@
           </a:prstGeom>
         </p:spPr>
         <p:txBody>
-          <a:bodyPr anchor="ctr" bIns="45720" lIns="91440" rIns="91440" rtlCol="0" tIns="45720" vert="horz"/>
+          <a:bodyPr vert="horz" lIns="91440" tIns="45720" rIns="91440" bIns="45720" rtlCol="0" anchor="ctr"/>
           <a:lstStyle>
             <a:lvl1pPr algn="r">
               <a:defRPr sz="900">
@@ -2807,7 +2809,7 @@
       </p:ext>
     </p:extLst>
   </p:cSld>
-  <p:clrMap accent1="accent1" accent2="accent2" accent3="accent3" accent4="accent4" accent5="accent5" accent6="accent6" bg1="lt1" bg2="lt2" folHlink="folHlink" hlink="hlink" tx1="dk1" tx2="dk2"/>
+  <p:clrMap bg1="lt1" tx1="dk1" bg2="lt2" tx2="dk2" accent1="accent1" accent2="accent2" accent3="accent3" accent4="accent4" accent5="accent5" accent6="accent6" hlink="hlink" folHlink="folHlink"/>
   <p:sldLayoutIdLst>
     <p:sldLayoutId id="2147483649" r:id="rId1"/>
     <p:sldLayoutId id="2147483650" r:id="rId2"/>
@@ -2823,12 +2825,12 @@
   </p:sldLayoutIdLst>
   <p:txStyles>
     <p:titleStyle>
-      <a:lvl1pPr algn="ctr" defTabSz="342900" eaLnBrk="1" hangingPunct="1" latinLnBrk="0" rtl="0">
+      <a:lvl1pPr algn="ctr" defTabSz="342900" rtl="0" eaLnBrk="1" latinLnBrk="0" hangingPunct="1">
         <a:spcBef>
           <a:spcPct val="0"/>
         </a:spcBef>
         <a:buNone/>
-        <a:defRPr kern="1200" sz="3300">
+        <a:defRPr sz="3300" kern="1200">
           <a:solidFill>
             <a:schemeClr val="tx1"/>
           </a:solidFill>
@@ -2839,13 +2841,13 @@
       </a:lvl1pPr>
     </p:titleStyle>
     <p:bodyStyle>
-      <a:lvl1pPr algn="l" defTabSz="342900" eaLnBrk="1" hangingPunct="1" indent="-342900" latinLnBrk="0" marL="342900" rtl="0">
+      <a:lvl1pPr marL="342900" indent="-342900" algn="l" defTabSz="342900" rtl="0" eaLnBrk="1" latinLnBrk="0" hangingPunct="1">
         <a:spcBef>
           <a:spcPct val="20000"/>
         </a:spcBef>
         <a:buFont typeface="Arial"/>
         <a:buChar char="•"/>
-        <a:defRPr kern="1200" sz="2400">
+        <a:defRPr sz="2400" kern="1200">
           <a:solidFill>
             <a:schemeClr val="tx1"/>
           </a:solidFill>
@@ -2854,13 +2856,13 @@
           <a:cs typeface="+mn-cs"/>
         </a:defRPr>
       </a:lvl1pPr>
-      <a:lvl2pPr algn="l" defTabSz="342900" eaLnBrk="1" hangingPunct="1" indent="-342900" latinLnBrk="0" marL="685800" rtl="0">
+      <a:lvl2pPr marL="685800" indent="-342900" algn="l" defTabSz="342900" rtl="0" eaLnBrk="1" latinLnBrk="0" hangingPunct="1">
         <a:spcBef>
           <a:spcPct val="20000"/>
         </a:spcBef>
         <a:buFont typeface="Arial"/>
         <a:buChar char="–"/>
-        <a:defRPr kern="1200" sz="2100">
+        <a:defRPr sz="2100" kern="1200">
           <a:solidFill>
             <a:schemeClr val="tx1"/>
           </a:solidFill>
@@ -2869,13 +2871,13 @@
           <a:cs typeface="+mn-cs"/>
         </a:defRPr>
       </a:lvl2pPr>
-      <a:lvl3pPr algn="l" defTabSz="342900" eaLnBrk="1" hangingPunct="1" indent="-342900" latinLnBrk="0" marL="1028700" rtl="0">
+      <a:lvl3pPr marL="1028700" indent="-342900" algn="l" defTabSz="342900" rtl="0" eaLnBrk="1" latinLnBrk="0" hangingPunct="1">
         <a:spcBef>
           <a:spcPct val="20000"/>
         </a:spcBef>
         <a:buFont typeface="Arial"/>
         <a:buChar char="•"/>
-        <a:defRPr kern="1200" sz="1800">
+        <a:defRPr sz="1800" kern="1200">
           <a:solidFill>
             <a:schemeClr val="tx1"/>
           </a:solidFill>
@@ -2884,13 +2886,13 @@
           <a:cs typeface="+mn-cs"/>
         </a:defRPr>
       </a:lvl3pPr>
-      <a:lvl4pPr algn="l" defTabSz="342900" eaLnBrk="1" hangingPunct="1" indent="-342900" latinLnBrk="0" marL="1371600" rtl="0">
+      <a:lvl4pPr marL="1371600" indent="-342900" algn="l" defTabSz="342900" rtl="0" eaLnBrk="1" latinLnBrk="0" hangingPunct="1">
         <a:spcBef>
           <a:spcPct val="20000"/>
         </a:spcBef>
         <a:buFont typeface="Arial"/>
         <a:buChar char="–"/>
-        <a:defRPr kern="1200" sz="1500">
+        <a:defRPr sz="1500" kern="1200">
           <a:solidFill>
             <a:schemeClr val="tx1"/>
           </a:solidFill>
@@ -2899,13 +2901,13 @@
           <a:cs typeface="+mn-cs"/>
         </a:defRPr>
       </a:lvl4pPr>
-      <a:lvl5pPr algn="l" defTabSz="342900" eaLnBrk="1" hangingPunct="1" indent="-342900" latinLnBrk="0" marL="1714500" rtl="0">
+      <a:lvl5pPr marL="1714500" indent="-342900" algn="l" defTabSz="342900" rtl="0" eaLnBrk="1" latinLnBrk="0" hangingPunct="1">
         <a:spcBef>
           <a:spcPct val="20000"/>
         </a:spcBef>
         <a:buFont typeface="Arial"/>
         <a:buChar char="»"/>
-        <a:defRPr kern="1200" sz="1500">
+        <a:defRPr sz="1500" kern="1200">
           <a:solidFill>
             <a:schemeClr val="tx1"/>
           </a:solidFill>
@@ -2914,13 +2916,13 @@
           <a:cs typeface="+mn-cs"/>
         </a:defRPr>
       </a:lvl5pPr>
-      <a:lvl6pPr algn="l" defTabSz="342900" eaLnBrk="1" hangingPunct="1" indent="-342900" latinLnBrk="0" marL="2057400" rtl="0">
+      <a:lvl6pPr marL="2057400" indent="-342900" algn="l" defTabSz="342900" rtl="0" eaLnBrk="1" latinLnBrk="0" hangingPunct="1">
         <a:spcBef>
           <a:spcPct val="20000"/>
         </a:spcBef>
         <a:buFont typeface="Arial"/>
         <a:buChar char="•"/>
-        <a:defRPr kern="1200" sz="1500">
+        <a:defRPr sz="1500" kern="1200">
           <a:solidFill>
             <a:schemeClr val="tx1"/>
           </a:solidFill>
@@ -2929,13 +2931,13 @@
           <a:cs typeface="+mn-cs"/>
         </a:defRPr>
       </a:lvl6pPr>
-      <a:lvl7pPr algn="l" defTabSz="342900" eaLnBrk="1" hangingPunct="1" indent="-342900" latinLnBrk="0" marL="2400300" rtl="0">
+      <a:lvl7pPr marL="2400300" indent="-342900" algn="l" defTabSz="342900" rtl="0" eaLnBrk="1" latinLnBrk="0" hangingPunct="1">
         <a:spcBef>
           <a:spcPct val="20000"/>
         </a:spcBef>
         <a:buFont typeface="Arial"/>
         <a:buChar char="•"/>
-        <a:defRPr kern="1200" sz="1500">
+        <a:defRPr sz="1500" kern="1200">
           <a:solidFill>
             <a:schemeClr val="tx1"/>
           </a:solidFill>
@@ -2944,13 +2946,13 @@
           <a:cs typeface="+mn-cs"/>
         </a:defRPr>
       </a:lvl7pPr>
-      <a:lvl8pPr algn="l" defTabSz="342900" eaLnBrk="1" hangingPunct="1" indent="-342900" latinLnBrk="0" marL="2743200" rtl="0">
+      <a:lvl8pPr marL="2743200" indent="-342900" algn="l" defTabSz="342900" rtl="0" eaLnBrk="1" latinLnBrk="0" hangingPunct="1">
         <a:spcBef>
           <a:spcPct val="20000"/>
         </a:spcBef>
         <a:buFont typeface="Arial"/>
         <a:buChar char="•"/>
-        <a:defRPr kern="1200" sz="1500">
+        <a:defRPr sz="1500" kern="1200">
           <a:solidFill>
             <a:schemeClr val="tx1"/>
           </a:solidFill>
@@ -2959,13 +2961,13 @@
           <a:cs typeface="+mn-cs"/>
         </a:defRPr>
       </a:lvl8pPr>
-      <a:lvl9pPr algn="l" defTabSz="342900" eaLnBrk="1" hangingPunct="1" indent="-342900" latinLnBrk="0" marL="3086100" rtl="0">
+      <a:lvl9pPr marL="3086100" indent="-342900" algn="l" defTabSz="342900" rtl="0" eaLnBrk="1" latinLnBrk="0" hangingPunct="1">
         <a:spcBef>
           <a:spcPct val="20000"/>
         </a:spcBef>
         <a:buFont typeface="Arial"/>
         <a:buChar char="•"/>
-        <a:defRPr kern="1200" sz="1500">
+        <a:defRPr sz="1500" kern="1200">
           <a:solidFill>
             <a:schemeClr val="tx1"/>
           </a:solidFill>
@@ -2979,8 +2981,8 @@
       <a:defPPr>
         <a:defRPr lang="en-US"/>
       </a:defPPr>
-      <a:lvl1pPr algn="l" defTabSz="342900" eaLnBrk="1" hangingPunct="1" latinLnBrk="0" marL="0" rtl="0">
-        <a:defRPr kern="1200" sz="1350">
+      <a:lvl1pPr marL="0" algn="l" defTabSz="342900" rtl="0" eaLnBrk="1" latinLnBrk="0" hangingPunct="1">
+        <a:defRPr sz="1350" kern="1200">
           <a:solidFill>
             <a:schemeClr val="tx1"/>
           </a:solidFill>
@@ -2989,8 +2991,8 @@
           <a:cs typeface="+mn-cs"/>
         </a:defRPr>
       </a:lvl1pPr>
-      <a:lvl2pPr algn="l" defTabSz="342900" eaLnBrk="1" hangingPunct="1" latinLnBrk="0" marL="342900" rtl="0">
-        <a:defRPr kern="1200" sz="1350">
+      <a:lvl2pPr marL="342900" algn="l" defTabSz="342900" rtl="0" eaLnBrk="1" latinLnBrk="0" hangingPunct="1">
+        <a:defRPr sz="1350" kern="1200">
           <a:solidFill>
             <a:schemeClr val="tx1"/>
           </a:solidFill>
@@ -2999,8 +3001,8 @@
           <a:cs typeface="+mn-cs"/>
         </a:defRPr>
       </a:lvl2pPr>
-      <a:lvl3pPr algn="l" defTabSz="342900" eaLnBrk="1" hangingPunct="1" latinLnBrk="0" marL="685800" rtl="0">
-        <a:defRPr kern="1200" sz="1350">
+      <a:lvl3pPr marL="685800" algn="l" defTabSz="342900" rtl="0" eaLnBrk="1" latinLnBrk="0" hangingPunct="1">
+        <a:defRPr sz="1350" kern="1200">
           <a:solidFill>
             <a:schemeClr val="tx1"/>
           </a:solidFill>
@@ -3009,8 +3011,8 @@
           <a:cs typeface="+mn-cs"/>
         </a:defRPr>
       </a:lvl3pPr>
-      <a:lvl4pPr algn="l" defTabSz="342900" eaLnBrk="1" hangingPunct="1" latinLnBrk="0" marL="1028700" rtl="0">
-        <a:defRPr kern="1200" sz="1350">
+      <a:lvl4pPr marL="1028700" algn="l" defTabSz="342900" rtl="0" eaLnBrk="1" latinLnBrk="0" hangingPunct="1">
+        <a:defRPr sz="1350" kern="1200">
           <a:solidFill>
             <a:schemeClr val="tx1"/>
           </a:solidFill>
@@ -3019,8 +3021,8 @@
           <a:cs typeface="+mn-cs"/>
         </a:defRPr>
       </a:lvl4pPr>
-      <a:lvl5pPr algn="l" defTabSz="342900" eaLnBrk="1" hangingPunct="1" latinLnBrk="0" marL="1371600" rtl="0">
-        <a:defRPr kern="1200" sz="1350">
+      <a:lvl5pPr marL="1371600" algn="l" defTabSz="342900" rtl="0" eaLnBrk="1" latinLnBrk="0" hangingPunct="1">
+        <a:defRPr sz="1350" kern="1200">
           <a:solidFill>
             <a:schemeClr val="tx1"/>
           </a:solidFill>
@@ -3029,8 +3031,8 @@
           <a:cs typeface="+mn-cs"/>
         </a:defRPr>
       </a:lvl5pPr>
-      <a:lvl6pPr algn="l" defTabSz="342900" eaLnBrk="1" hangingPunct="1" latinLnBrk="0" marL="1714500" rtl="0">
-        <a:defRPr kern="1200" sz="1350">
+      <a:lvl6pPr marL="1714500" algn="l" defTabSz="342900" rtl="0" eaLnBrk="1" latinLnBrk="0" hangingPunct="1">
+        <a:defRPr sz="1350" kern="1200">
           <a:solidFill>
             <a:schemeClr val="tx1"/>
           </a:solidFill>
@@ -3039,8 +3041,8 @@
           <a:cs typeface="+mn-cs"/>
         </a:defRPr>
       </a:lvl6pPr>
-      <a:lvl7pPr algn="l" defTabSz="342900" eaLnBrk="1" hangingPunct="1" latinLnBrk="0" marL="2057400" rtl="0">
-        <a:defRPr kern="1200" sz="1350">
+      <a:lvl7pPr marL="2057400" algn="l" defTabSz="342900" rtl="0" eaLnBrk="1" latinLnBrk="0" hangingPunct="1">
+        <a:defRPr sz="1350" kern="1200">
           <a:solidFill>
             <a:schemeClr val="tx1"/>
           </a:solidFill>
@@ -3049,8 +3051,8 @@
           <a:cs typeface="+mn-cs"/>
         </a:defRPr>
       </a:lvl7pPr>
-      <a:lvl8pPr algn="l" defTabSz="342900" eaLnBrk="1" hangingPunct="1" latinLnBrk="0" marL="2400300" rtl="0">
-        <a:defRPr kern="1200" sz="1350">
+      <a:lvl8pPr marL="2400300" algn="l" defTabSz="342900" rtl="0" eaLnBrk="1" latinLnBrk="0" hangingPunct="1">
+        <a:defRPr sz="1350" kern="1200">
           <a:solidFill>
             <a:schemeClr val="tx1"/>
           </a:solidFill>
@@ -3059,8 +3061,8 @@
           <a:cs typeface="+mn-cs"/>
         </a:defRPr>
       </a:lvl8pPr>
-      <a:lvl9pPr algn="l" defTabSz="342900" eaLnBrk="1" hangingPunct="1" latinLnBrk="0" marL="2743200" rtl="0">
-        <a:defRPr kern="1200" sz="1350">
+      <a:lvl9pPr marL="2743200" algn="l" defTabSz="342900" rtl="0" eaLnBrk="1" latinLnBrk="0" hangingPunct="1">
+        <a:defRPr sz="1350" kern="1200">
           <a:solidFill>
             <a:schemeClr val="tx1"/>
           </a:solidFill>
@@ -3111,11 +3113,10 @@
           <a:bodyPr/>
           <a:lstStyle/>
           <a:p>
-            <a:pPr lvl="0" indent="0" marL="0">
+            <a:pPr marL="0" lvl="0" indent="0">
               <a:buNone/>
             </a:pPr>
             <a:r>
-              <a:rPr/>
               <a:t>ExploratoryAnalysis</a:t>
             </a:r>
           </a:p>
@@ -3128,7 +3129,7 @@
             <a:spLocks noGrp="1"/>
           </p:cNvSpPr>
           <p:nvPr>
-            <p:ph idx="1" type="subTitle"/>
+            <p:ph type="subTitle" idx="1"/>
           </p:nvPr>
         </p:nvSpPr>
         <p:spPr>
@@ -3141,13 +3142,12 @@
           <a:bodyPr/>
           <a:lstStyle/>
           <a:p>
-            <a:pPr lvl="0" indent="0" marL="0">
+            <a:pPr marL="0" lvl="0" indent="0">
               <a:buNone/>
             </a:pPr>
             <a:br/>
             <a:br/>
             <a:r>
-              <a:rPr/>
               <a:t>King Dedede</a:t>
             </a:r>
           </a:p>
@@ -3160,19 +3160,18 @@
             <a:spLocks noGrp="1"/>
           </p:cNvSpPr>
           <p:nvPr>
-            <p:ph idx="10" sz="half" type="dt"/>
-          </p:nvPr>
-        </p:nvSpPr>
-        <p:spPr/>
-        <p:txBody>
-          <a:bodyPr/>
-          <a:lstStyle/>
-          <a:p>
-            <a:pPr lvl="0" indent="0" marL="0">
+            <p:ph type="dt" sz="half" idx="10"/>
+          </p:nvPr>
+        </p:nvSpPr>
+        <p:spPr/>
+        <p:txBody>
+          <a:bodyPr/>
+          <a:lstStyle/>
+          <a:p>
+            <a:pPr marL="0" lvl="0" indent="0">
               <a:buNone/>
             </a:pPr>
             <a:r>
-              <a:rPr/>
               <a:t>2025-03-03</a:t>
             </a:r>
           </a:p>
@@ -3180,6 +3179,9 @@
       </p:sp>
     </p:spTree>
   </p:cSld>
+  <p:clrMapOvr>
+    <a:masterClrMapping/>
+  </p:clrMapOvr>
 </p:sld>
 </file>
 
@@ -3215,12 +3217,11 @@
           <a:bodyPr/>
           <a:lstStyle/>
           <a:p>
-            <a:pPr lvl="0" indent="0" marL="0">
+            <a:pPr marL="0" lvl="0" indent="0">
               <a:buNone/>
             </a:pPr>
             <a:r>
-              <a:rPr/>
-              <a:t>Header 1</a:t>
+              <a:t>Soccer Data Analysis</a:t>
             </a:r>
           </a:p>
         </p:txBody>
@@ -3240,20 +3241,208 @@
           <a:bodyPr/>
           <a:lstStyle/>
           <a:p>
-            <a:pPr lvl="0" indent="0">
+            <a:pPr marL="0" lvl="0" indent="0">
               <a:buNone/>
             </a:pPr>
             <a:r>
-              <a:rPr>
-                <a:latin typeface="Courier"/>
-              </a:rPr>
-              <a:t>## [1] 3</a:t>
+              <a:t>Aaron Graff, Juan Gonzalez, Andrew Henderson, Cody Farris</a:t>
             </a:r>
           </a:p>
         </p:txBody>
       </p:sp>
     </p:spTree>
   </p:cSld>
+  <p:clrMapOvr>
+    <a:masterClrMapping/>
+  </p:clrMapOvr>
+</p:sld>
+</file>
+
+<file path=ppt/slides/slide3.xml><?xml version="1.0" encoding="utf-8"?>
+<p:sld xmlns:a="http://schemas.openxmlformats.org/drawingml/2006/main" xmlns:r="http://schemas.openxmlformats.org/officeDocument/2006/relationships" xmlns:p="http://schemas.openxmlformats.org/presentationml/2006/main">
+  <p:cSld>
+    <p:spTree>
+      <p:nvGrpSpPr>
+        <p:cNvPr id="1" name=""/>
+        <p:cNvGrpSpPr/>
+        <p:nvPr/>
+      </p:nvGrpSpPr>
+      <p:grpSpPr>
+        <a:xfrm>
+          <a:off x="0" y="0"/>
+          <a:ext cx="0" cy="0"/>
+          <a:chOff x="0" y="0"/>
+          <a:chExt cx="0" cy="0"/>
+        </a:xfrm>
+      </p:grpSpPr>
+      <p:sp>
+        <p:nvSpPr>
+          <p:cNvPr id="2" name="Title 1"/>
+          <p:cNvSpPr>
+            <a:spLocks noGrp="1"/>
+          </p:cNvSpPr>
+          <p:nvPr>
+            <p:ph type="title"/>
+          </p:nvPr>
+        </p:nvSpPr>
+        <p:spPr/>
+        <p:txBody>
+          <a:bodyPr/>
+          <a:lstStyle/>
+          <a:p>
+            <a:pPr marL="0" lvl="0" indent="0">
+              <a:buNone/>
+            </a:pPr>
+            <a:r>
+              <a:t>Research Questions and Potential Methods</a:t>
+            </a:r>
+          </a:p>
+        </p:txBody>
+      </p:sp>
+      <p:sp>
+        <p:nvSpPr>
+          <p:cNvPr id="3" name="Content Placeholder 2"/>
+          <p:cNvSpPr>
+            <a:spLocks noGrp="1"/>
+          </p:cNvSpPr>
+          <p:nvPr>
+            <p:ph idx="1"/>
+          </p:nvPr>
+        </p:nvSpPr>
+        <p:spPr/>
+        <p:txBody>
+          <a:bodyPr/>
+          <a:lstStyle/>
+          <a:p>
+            <a:pPr lvl="0"/>
+            <a:r>
+              <a:t>Can we identify lower league players, as well as specific statistics that are indicators for potential success in La Liga?</a:t>
+            </a:r>
+          </a:p>
+          <a:p>
+            <a:pPr lvl="0"/>
+            <a:r>
+              <a:t>Using modeling, can we distinguish which statistics in particular are most heavily correlated (most important) to player success in La Liga?</a:t>
+            </a:r>
+          </a:p>
+          <a:p>
+            <a:pPr lvl="0"/>
+            <a:r>
+              <a:t>What are the most valuable Key Performance Indicators (KPIs) in La Liga, as well as other lower-level leagues in Spain? Do lower-level leagues require more defense, for example, than La Liga?</a:t>
+            </a:r>
+          </a:p>
+        </p:txBody>
+      </p:sp>
+    </p:spTree>
+  </p:cSld>
+  <p:clrMapOvr>
+    <a:masterClrMapping/>
+  </p:clrMapOvr>
+</p:sld>
+</file>
+
+<file path=ppt/slides/slide4.xml><?xml version="1.0" encoding="utf-8"?>
+<p:sld xmlns:a="http://schemas.openxmlformats.org/drawingml/2006/main" xmlns:r="http://schemas.openxmlformats.org/officeDocument/2006/relationships" xmlns:p="http://schemas.openxmlformats.org/presentationml/2006/main">
+  <p:cSld>
+    <p:spTree>
+      <p:nvGrpSpPr>
+        <p:cNvPr id="1" name=""/>
+        <p:cNvGrpSpPr/>
+        <p:nvPr/>
+      </p:nvGrpSpPr>
+      <p:grpSpPr>
+        <a:xfrm>
+          <a:off x="0" y="0"/>
+          <a:ext cx="0" cy="0"/>
+          <a:chOff x="0" y="0"/>
+          <a:chExt cx="0" cy="0"/>
+        </a:xfrm>
+      </p:grpSpPr>
+      <p:sp>
+        <p:nvSpPr>
+          <p:cNvPr id="2" name="Title 1"/>
+          <p:cNvSpPr>
+            <a:spLocks noGrp="1"/>
+          </p:cNvSpPr>
+          <p:nvPr>
+            <p:ph type="title"/>
+          </p:nvPr>
+        </p:nvSpPr>
+        <p:spPr/>
+        <p:txBody>
+          <a:bodyPr/>
+          <a:lstStyle/>
+          <a:p>
+            <a:pPr marL="0" lvl="0" indent="0">
+              <a:buNone/>
+            </a:pPr>
+            <a:r>
+              <a:t>Dataset and Variable Details</a:t>
+            </a:r>
+          </a:p>
+        </p:txBody>
+      </p:sp>
+      <p:sp>
+        <p:nvSpPr>
+          <p:cNvPr id="3" name="Content Placeholder 2"/>
+          <p:cNvSpPr>
+            <a:spLocks noGrp="1"/>
+          </p:cNvSpPr>
+          <p:nvPr>
+            <p:ph idx="1"/>
+          </p:nvPr>
+        </p:nvSpPr>
+        <p:spPr/>
+        <p:txBody>
+          <a:bodyPr/>
+          <a:lstStyle/>
+          <a:p>
+            <a:pPr lvl="0"/>
+            <a:r>
+              <a:t>We have two main datasets that we will be utilizing:</a:t>
+            </a:r>
+          </a:p>
+          <a:p>
+            <a:pPr lvl="1"/>
+            <a:r>
+              <a:t>Stathead Soccer Data: Data consisting of field players statistics (non-goalies) since the 2017-2018 season (when advanced statistics started to be calculated). These statistics include:</a:t>
+            </a:r>
+          </a:p>
+        </p:txBody>
+      </p:sp>
+      <p:sp>
+        <p:nvSpPr>
+          <p:cNvPr id="4" name="Content Placeholder 2"/>
+          <p:cNvSpPr>
+            <a:spLocks noGrp="1"/>
+          </p:cNvSpPr>
+          <p:nvPr>
+            <p:ph idx="4294967295"/>
+          </p:nvPr>
+        </p:nvSpPr>
+        <p:spPr/>
+        <p:txBody>
+          <a:bodyPr/>
+          <a:lstStyle/>
+          <a:p>
+            <a:pPr lvl="0"/>
+            <a:r>
+              <a:t>We have two main datasets that we will be utilizing:</a:t>
+            </a:r>
+          </a:p>
+          <a:p>
+            <a:pPr lvl="1"/>
+            <a:r>
+              <a:t>Stathead Soccer Data: Data consisting of field players statistics (non-goalies) since the 2017-2018 season (when advanced statistics started to be calculated). These statistics include:</a:t>
+            </a:r>
+          </a:p>
+        </p:txBody>
+      </p:sp>
+    </p:spTree>
+  </p:cSld>
+  <p:clrMapOvr>
+    <a:masterClrMapping/>
+  </p:clrMapOvr>
 </p:sld>
 </file>
 
@@ -3575,265 +3764,4 @@
   </a:objectDefaults>
   <a:extraClrSchemeLst/>
 </a:theme>
-</file>
-
-<file path=ppt/theme/theme2.xml><?xml version="1.0" encoding="utf-8"?>
-<a:theme xmlns:a="http://schemas.openxmlformats.org/drawingml/2006/main" name="Office Theme">
-  <a:themeElements>
-    <a:clrScheme name="Office">
-      <a:dk1>
-        <a:sysClr val="windowText" lastClr="000000"/>
-      </a:dk1>
-      <a:lt1>
-        <a:sysClr val="window" lastClr="FFFFFF"/>
-      </a:lt1>
-      <a:dk2>
-        <a:srgbClr val="44546A"/>
-      </a:dk2>
-      <a:lt2>
-        <a:srgbClr val="E7E6E6"/>
-      </a:lt2>
-      <a:accent1>
-        <a:srgbClr val="5B9BD5"/>
-      </a:accent1>
-      <a:accent2>
-        <a:srgbClr val="ED7D31"/>
-      </a:accent2>
-      <a:accent3>
-        <a:srgbClr val="A5A5A5"/>
-      </a:accent3>
-      <a:accent4>
-        <a:srgbClr val="FFC000"/>
-      </a:accent4>
-      <a:accent5>
-        <a:srgbClr val="4472C4"/>
-      </a:accent5>
-      <a:accent6>
-        <a:srgbClr val="70AD47"/>
-      </a:accent6>
-      <a:hlink>
-        <a:srgbClr val="0563C1"/>
-      </a:hlink>
-      <a:folHlink>
-        <a:srgbClr val="954F72"/>
-      </a:folHlink>
-    </a:clrScheme>
-    <a:fontScheme name="Office">
-      <a:majorFont>
-        <a:latin typeface="Calibri Light" panose="020F0302020204030204"/>
-        <a:ea typeface=""/>
-        <a:cs typeface=""/>
-        <a:font script="Jpan" typeface="ＭＳ Ｐゴシック"/>
-        <a:font script="Hang" typeface="맑은 고딕"/>
-        <a:font script="Hans" typeface="宋体"/>
-        <a:font script="Hant" typeface="新細明體"/>
-        <a:font script="Arab" typeface="Times New Roman"/>
-        <a:font script="Hebr" typeface="Times New Roman"/>
-        <a:font script="Thai" typeface="Angsana New"/>
-        <a:font script="Ethi" typeface="Nyala"/>
-        <a:font script="Beng" typeface="Vrinda"/>
-        <a:font script="Gujr" typeface="Shruti"/>
-        <a:font script="Khmr" typeface="MoolBoran"/>
-        <a:font script="Knda" typeface="Tunga"/>
-        <a:font script="Guru" typeface="Raavi"/>
-        <a:font script="Cans" typeface="Euphemia"/>
-        <a:font script="Cher" typeface="Plantagenet Cherokee"/>
-        <a:font script="Yiii" typeface="Microsoft Yi Baiti"/>
-        <a:font script="Tibt" typeface="Microsoft Himalaya"/>
-        <a:font script="Thaa" typeface="MV Boli"/>
-        <a:font script="Deva" typeface="Mangal"/>
-        <a:font script="Telu" typeface="Gautami"/>
-        <a:font script="Taml" typeface="Latha"/>
-        <a:font script="Syrc" typeface="Estrangelo Edessa"/>
-        <a:font script="Orya" typeface="Kalinga"/>
-        <a:font script="Mlym" typeface="Kartika"/>
-        <a:font script="Laoo" typeface="DokChampa"/>
-        <a:font script="Sinh" typeface="Iskoola Pota"/>
-        <a:font script="Mong" typeface="Mongolian Baiti"/>
-        <a:font script="Viet" typeface="Times New Roman"/>
-        <a:font script="Uigh" typeface="Microsoft Uighur"/>
-        <a:font script="Geor" typeface="Sylfaen"/>
-      </a:majorFont>
-      <a:minorFont>
-        <a:latin typeface="Calibri" panose="020F0502020204030204"/>
-        <a:ea typeface=""/>
-        <a:cs typeface=""/>
-        <a:font script="Jpan" typeface="ＭＳ Ｐゴシック"/>
-        <a:font script="Hang" typeface="맑은 고딕"/>
-        <a:font script="Hans" typeface="宋体"/>
-        <a:font script="Hant" typeface="新細明體"/>
-        <a:font script="Arab" typeface="Arial"/>
-        <a:font script="Hebr" typeface="Arial"/>
-        <a:font script="Thai" typeface="Cordia New"/>
-        <a:font script="Ethi" typeface="Nyala"/>
-        <a:font script="Beng" typeface="Vrinda"/>
-        <a:font script="Gujr" typeface="Shruti"/>
-        <a:font script="Khmr" typeface="DaunPenh"/>
-        <a:font script="Knda" typeface="Tunga"/>
-        <a:font script="Guru" typeface="Raavi"/>
-        <a:font script="Cans" typeface="Euphemia"/>
-        <a:font script="Cher" typeface="Plantagenet Cherokee"/>
-        <a:font script="Yiii" typeface="Microsoft Yi Baiti"/>
-        <a:font script="Tibt" typeface="Microsoft Himalaya"/>
-        <a:font script="Thaa" typeface="MV Boli"/>
-        <a:font script="Deva" typeface="Mangal"/>
-        <a:font script="Telu" typeface="Gautami"/>
-        <a:font script="Taml" typeface="Latha"/>
-        <a:font script="Syrc" typeface="Estrangelo Edessa"/>
-        <a:font script="Orya" typeface="Kalinga"/>
-        <a:font script="Mlym" typeface="Kartika"/>
-        <a:font script="Laoo" typeface="DokChampa"/>
-        <a:font script="Sinh" typeface="Iskoola Pota"/>
-        <a:font script="Mong" typeface="Mongolian Baiti"/>
-        <a:font script="Viet" typeface="Arial"/>
-        <a:font script="Uigh" typeface="Microsoft Uighur"/>
-        <a:font script="Geor" typeface="Sylfaen"/>
-      </a:minorFont>
-    </a:fontScheme>
-    <a:fmtScheme name="Office">
-      <a:fillStyleLst>
-        <a:solidFill>
-          <a:schemeClr val="phClr"/>
-        </a:solidFill>
-        <a:gradFill rotWithShape="1">
-          <a:gsLst>
-            <a:gs pos="0">
-              <a:schemeClr val="phClr">
-                <a:lumMod val="110000"/>
-                <a:satMod val="105000"/>
-                <a:tint val="67000"/>
-              </a:schemeClr>
-            </a:gs>
-            <a:gs pos="50000">
-              <a:schemeClr val="phClr">
-                <a:lumMod val="105000"/>
-                <a:satMod val="103000"/>
-                <a:tint val="73000"/>
-              </a:schemeClr>
-            </a:gs>
-            <a:gs pos="100000">
-              <a:schemeClr val="phClr">
-                <a:lumMod val="105000"/>
-                <a:satMod val="109000"/>
-                <a:tint val="81000"/>
-              </a:schemeClr>
-            </a:gs>
-          </a:gsLst>
-          <a:lin ang="5400000" scaled="0"/>
-        </a:gradFill>
-        <a:gradFill rotWithShape="1">
-          <a:gsLst>
-            <a:gs pos="0">
-              <a:schemeClr val="phClr">
-                <a:satMod val="103000"/>
-                <a:lumMod val="102000"/>
-                <a:tint val="94000"/>
-              </a:schemeClr>
-            </a:gs>
-            <a:gs pos="50000">
-              <a:schemeClr val="phClr">
-                <a:satMod val="110000"/>
-                <a:lumMod val="100000"/>
-                <a:shade val="100000"/>
-              </a:schemeClr>
-            </a:gs>
-            <a:gs pos="100000">
-              <a:schemeClr val="phClr">
-                <a:lumMod val="99000"/>
-                <a:satMod val="120000"/>
-                <a:shade val="78000"/>
-              </a:schemeClr>
-            </a:gs>
-          </a:gsLst>
-          <a:lin ang="5400000" scaled="0"/>
-        </a:gradFill>
-      </a:fillStyleLst>
-      <a:lnStyleLst>
-        <a:ln w="6350" cap="flat" cmpd="sng" algn="ctr">
-          <a:solidFill>
-            <a:schemeClr val="phClr"/>
-          </a:solidFill>
-          <a:prstDash val="solid"/>
-          <a:miter lim="800000"/>
-        </a:ln>
-        <a:ln w="12700" cap="flat" cmpd="sng" algn="ctr">
-          <a:solidFill>
-            <a:schemeClr val="phClr"/>
-          </a:solidFill>
-          <a:prstDash val="solid"/>
-          <a:miter lim="800000"/>
-        </a:ln>
-        <a:ln w="19050" cap="flat" cmpd="sng" algn="ctr">
-          <a:solidFill>
-            <a:schemeClr val="phClr"/>
-          </a:solidFill>
-          <a:prstDash val="solid"/>
-          <a:miter lim="800000"/>
-        </a:ln>
-      </a:lnStyleLst>
-      <a:effectStyleLst>
-        <a:effectStyle>
-          <a:effectLst/>
-        </a:effectStyle>
-        <a:effectStyle>
-          <a:effectLst/>
-        </a:effectStyle>
-        <a:effectStyle>
-          <a:effectLst>
-            <a:outerShdw blurRad="57150" dist="19050" dir="5400000" algn="ctr" rotWithShape="0">
-              <a:srgbClr val="000000">
-                <a:alpha val="63000"/>
-              </a:srgbClr>
-            </a:outerShdw>
-          </a:effectLst>
-        </a:effectStyle>
-      </a:effectStyleLst>
-      <a:bgFillStyleLst>
-        <a:solidFill>
-          <a:schemeClr val="phClr"/>
-        </a:solidFill>
-        <a:solidFill>
-          <a:schemeClr val="phClr">
-            <a:tint val="95000"/>
-            <a:satMod val="170000"/>
-          </a:schemeClr>
-        </a:solidFill>
-        <a:gradFill rotWithShape="1">
-          <a:gsLst>
-            <a:gs pos="0">
-              <a:schemeClr val="phClr">
-                <a:tint val="93000"/>
-                <a:satMod val="150000"/>
-                <a:shade val="98000"/>
-                <a:lumMod val="102000"/>
-              </a:schemeClr>
-            </a:gs>
-            <a:gs pos="50000">
-              <a:schemeClr val="phClr">
-                <a:tint val="98000"/>
-                <a:satMod val="130000"/>
-                <a:shade val="90000"/>
-                <a:lumMod val="103000"/>
-              </a:schemeClr>
-            </a:gs>
-            <a:gs pos="100000">
-              <a:schemeClr val="phClr">
-                <a:shade val="63000"/>
-                <a:satMod val="120000"/>
-              </a:schemeClr>
-            </a:gs>
-          </a:gsLst>
-          <a:lin ang="5400000" scaled="0"/>
-        </a:gradFill>
-      </a:bgFillStyleLst>
-    </a:fmtScheme>
-  </a:themeElements>
-  <a:objectDefaults/>
-  <a:extraClrSchemeLst/>
-  <a:extLst>
-    <a:ext uri="{05A4C25C-085E-4340-85A3-A5531E510DB2}">
-      <thm15:themeFamily xmlns:thm15="http://schemas.microsoft.com/office/thememl/2012/main" name="Office Theme" id="{62F939B6-93AF-4DB8-9C6B-D6C7DFDC589F}" vid="{4A3C46E8-61CC-4603-A589-7422A47A8E4A}"/>
-    </a:ext>
-  </a:extLst>
-</a:theme>
 </file>
</xml_diff>